<commit_message>
final tweaks to slides
</commit_message>
<xml_diff>
--- a/ClassMaterials/ComparableAndComparators/Slides/Part3-FinalExam.pptx
+++ b/ClassMaterials/ComparableAndComparators/Slides/Part3-FinalExam.pptx
@@ -437,7 +437,7 @@
               <a:pPr>
                 <a:defRPr/>
               </a:pPr>
-              <a:t>5/26/2025</a:t>
+              <a:t>6/5/2025</a:t>
             </a:fld>
             <a:endParaRPr lang="en-US"/>
           </a:p>
@@ -672,7 +672,7 @@
               <a:pPr>
                 <a:defRPr/>
               </a:pPr>
-              <a:t>5/26/2025</a:t>
+              <a:t>6/5/2025</a:t>
             </a:fld>
             <a:endParaRPr lang="en-US"/>
           </a:p>
@@ -1341,7 +1341,7 @@
               <a:pPr>
                 <a:defRPr/>
               </a:pPr>
-              <a:t>Monday, May 26, 2025</a:t>
+              <a:t>Thursday, June 5, 2025</a:t>
             </a:fld>
             <a:endParaRPr lang="en-US" dirty="0"/>
           </a:p>
@@ -1524,7 +1524,7 @@
               <a:pPr>
                 <a:defRPr/>
               </a:pPr>
-              <a:t>Monday, May 26, 2025</a:t>
+              <a:t>Thursday, June 5, 2025</a:t>
             </a:fld>
             <a:endParaRPr lang="en-US" dirty="0"/>
           </a:p>
@@ -1717,7 +1717,7 @@
               <a:pPr>
                 <a:defRPr/>
               </a:pPr>
-              <a:t>Monday, May 26, 2025</a:t>
+              <a:t>Thursday, June 5, 2025</a:t>
             </a:fld>
             <a:endParaRPr lang="en-US" dirty="0"/>
           </a:p>
@@ -1900,7 +1900,7 @@
               <a:pPr>
                 <a:defRPr/>
               </a:pPr>
-              <a:t>Monday, May 26, 2025</a:t>
+              <a:t>Thursday, June 5, 2025</a:t>
             </a:fld>
             <a:endParaRPr lang="en-US" dirty="0"/>
           </a:p>
@@ -2160,7 +2160,7 @@
               <a:pPr>
                 <a:defRPr/>
               </a:pPr>
-              <a:t>Monday, May 26, 2025</a:t>
+              <a:t>Thursday, June 5, 2025</a:t>
             </a:fld>
             <a:endParaRPr lang="en-US"/>
           </a:p>
@@ -2460,7 +2460,7 @@
               <a:pPr>
                 <a:defRPr/>
               </a:pPr>
-              <a:t>Monday, May 26, 2025</a:t>
+              <a:t>Thursday, June 5, 2025</a:t>
             </a:fld>
             <a:endParaRPr lang="en-US"/>
           </a:p>
@@ -2894,7 +2894,7 @@
               <a:pPr>
                 <a:defRPr/>
               </a:pPr>
-              <a:t>Monday, May 26, 2025</a:t>
+              <a:t>Thursday, June 5, 2025</a:t>
             </a:fld>
             <a:endParaRPr lang="en-US"/>
           </a:p>
@@ -3026,7 +3026,7 @@
               <a:pPr>
                 <a:defRPr/>
               </a:pPr>
-              <a:t>Monday, May 26, 2025</a:t>
+              <a:t>Thursday, June 5, 2025</a:t>
             </a:fld>
             <a:endParaRPr lang="en-US"/>
           </a:p>
@@ -3136,7 +3136,7 @@
               <a:pPr>
                 <a:defRPr/>
               </a:pPr>
-              <a:t>Monday, May 26, 2025</a:t>
+              <a:t>Thursday, June 5, 2025</a:t>
             </a:fld>
             <a:endParaRPr lang="en-US" dirty="0"/>
           </a:p>
@@ -3426,7 +3426,7 @@
               <a:pPr>
                 <a:defRPr/>
               </a:pPr>
-              <a:t>Monday, May 26, 2025</a:t>
+              <a:t>Thursday, June 5, 2025</a:t>
             </a:fld>
             <a:endParaRPr lang="en-US"/>
           </a:p>
@@ -3693,7 +3693,7 @@
               <a:pPr>
                 <a:defRPr/>
               </a:pPr>
-              <a:t>Monday, May 26, 2025</a:t>
+              <a:t>Thursday, June 5, 2025</a:t>
             </a:fld>
             <a:endParaRPr lang="en-US"/>
           </a:p>
@@ -3919,7 +3919,7 @@
               <a:pPr>
                 <a:defRPr/>
               </a:pPr>
-              <a:t>Monday, May 26, 2025</a:t>
+              <a:t>Thursday, June 5, 2025</a:t>
             </a:fld>
             <a:endParaRPr lang="en-US" dirty="0"/>
           </a:p>

</xml_diff>